<commit_message>
update all materials for module 3
</commit_message>
<xml_diff>
--- a/modules/module3/understanding-in-reduced-dimensions.pptx
+++ b/modules/module3/understanding-in-reduced-dimensions.pptx
@@ -40,6 +40,7 @@
     <p:sldId id="371" r:id="rId34"/>
     <p:sldId id="372" r:id="rId35"/>
     <p:sldId id="373" r:id="rId36"/>
+    <p:sldId id="384" r:id="rId37"/>
   </p:sldIdLst>
   <p:sldSz cx="9144000" cy="6858000" type="screen4x3"/>
   <p:notesSz cx="6985000" cy="9283700"/>
@@ -277,7 +278,7 @@
           <a:p>
             <a:fld id="{A88406D7-9484-4D13-B809-79C8000663B8}" type="datetimeFigureOut">
               <a:rPr lang="en-US" smtClean="0"/>
-              <a:t>6/23/2018</a:t>
+              <a:t>6/25/18</a:t>
             </a:fld>
             <a:endParaRPr lang="en-US"/>
           </a:p>
@@ -447,7 +448,7 @@
           <a:p>
             <a:fld id="{A88406D7-9484-4D13-B809-79C8000663B8}" type="datetimeFigureOut">
               <a:rPr lang="en-US" smtClean="0"/>
-              <a:t>6/23/2018</a:t>
+              <a:t>6/25/18</a:t>
             </a:fld>
             <a:endParaRPr lang="en-US"/>
           </a:p>
@@ -627,7 +628,7 @@
           <a:p>
             <a:fld id="{A88406D7-9484-4D13-B809-79C8000663B8}" type="datetimeFigureOut">
               <a:rPr lang="en-US" smtClean="0"/>
-              <a:t>6/23/2018</a:t>
+              <a:t>6/25/18</a:t>
             </a:fld>
             <a:endParaRPr lang="en-US"/>
           </a:p>
@@ -797,7 +798,7 @@
           <a:p>
             <a:fld id="{A88406D7-9484-4D13-B809-79C8000663B8}" type="datetimeFigureOut">
               <a:rPr lang="en-US" smtClean="0"/>
-              <a:t>6/23/2018</a:t>
+              <a:t>6/25/18</a:t>
             </a:fld>
             <a:endParaRPr lang="en-US"/>
           </a:p>
@@ -1041,7 +1042,7 @@
           <a:p>
             <a:fld id="{A88406D7-9484-4D13-B809-79C8000663B8}" type="datetimeFigureOut">
               <a:rPr lang="en-US" smtClean="0"/>
-              <a:t>6/23/2018</a:t>
+              <a:t>6/25/18</a:t>
             </a:fld>
             <a:endParaRPr lang="en-US"/>
           </a:p>
@@ -1273,7 +1274,7 @@
           <a:p>
             <a:fld id="{A88406D7-9484-4D13-B809-79C8000663B8}" type="datetimeFigureOut">
               <a:rPr lang="en-US" smtClean="0"/>
-              <a:t>6/23/2018</a:t>
+              <a:t>6/25/18</a:t>
             </a:fld>
             <a:endParaRPr lang="en-US"/>
           </a:p>
@@ -1640,7 +1641,7 @@
           <a:p>
             <a:fld id="{A88406D7-9484-4D13-B809-79C8000663B8}" type="datetimeFigureOut">
               <a:rPr lang="en-US" smtClean="0"/>
-              <a:t>6/23/2018</a:t>
+              <a:t>6/25/18</a:t>
             </a:fld>
             <a:endParaRPr lang="en-US"/>
           </a:p>
@@ -1758,7 +1759,7 @@
           <a:p>
             <a:fld id="{A88406D7-9484-4D13-B809-79C8000663B8}" type="datetimeFigureOut">
               <a:rPr lang="en-US" smtClean="0"/>
-              <a:t>6/23/2018</a:t>
+              <a:t>6/25/18</a:t>
             </a:fld>
             <a:endParaRPr lang="en-US"/>
           </a:p>
@@ -1853,7 +1854,7 @@
           <a:p>
             <a:fld id="{A88406D7-9484-4D13-B809-79C8000663B8}" type="datetimeFigureOut">
               <a:rPr lang="en-US" smtClean="0"/>
-              <a:t>6/23/2018</a:t>
+              <a:t>6/25/18</a:t>
             </a:fld>
             <a:endParaRPr lang="en-US"/>
           </a:p>
@@ -2130,7 +2131,7 @@
           <a:p>
             <a:fld id="{A88406D7-9484-4D13-B809-79C8000663B8}" type="datetimeFigureOut">
               <a:rPr lang="en-US" smtClean="0"/>
-              <a:t>6/23/2018</a:t>
+              <a:t>6/25/18</a:t>
             </a:fld>
             <a:endParaRPr lang="en-US"/>
           </a:p>
@@ -2387,7 +2388,7 @@
           <a:p>
             <a:fld id="{A88406D7-9484-4D13-B809-79C8000663B8}" type="datetimeFigureOut">
               <a:rPr lang="en-US" smtClean="0"/>
-              <a:t>6/23/2018</a:t>
+              <a:t>6/25/18</a:t>
             </a:fld>
             <a:endParaRPr lang="en-US"/>
           </a:p>
@@ -2600,7 +2601,7 @@
           <a:p>
             <a:fld id="{A88406D7-9484-4D13-B809-79C8000663B8}" type="datetimeFigureOut">
               <a:rPr lang="en-US" smtClean="0"/>
-              <a:t>6/23/2018</a:t>
+              <a:t>6/25/18</a:t>
             </a:fld>
             <a:endParaRPr lang="en-US"/>
           </a:p>
@@ -10184,11 +10185,7 @@
             </a:r>
             <a:r>
               <a:rPr lang="en-US" dirty="0"/>
-              <a:t>· </a:t>
-            </a:r>
-            <a:r>
-              <a:rPr lang="en-US" dirty="0"/>
-              <a:t>GATA3 + </a:t>
+              <a:t>· GATA3 + </a:t>
             </a:r>
             <a:r>
               <a:rPr lang="en-US" b="1" dirty="0" smtClean="0"/>
@@ -10206,7 +10203,6 @@
               <a:rPr lang="en-US" dirty="0" smtClean="0"/>
               <a:t>XBP1</a:t>
             </a:r>
-            <a:endParaRPr lang="en-US" dirty="0" smtClean="0"/>
           </a:p>
         </p:txBody>
       </p:sp>
@@ -10304,11 +10300,7 @@
             </a:pPr>
             <a:r>
               <a:rPr lang="en-US" dirty="0" smtClean="0"/>
-              <a:t>pc</a:t>
-            </a:r>
-            <a:r>
-              <a:rPr lang="en-US" dirty="0" smtClean="0"/>
-              <a:t>(</a:t>
+              <a:t>pc(</a:t>
             </a:r>
             <a:r>
               <a:rPr lang="en-US" dirty="0" smtClean="0">
@@ -10348,11 +10340,7 @@
             </a:r>
             <a:r>
               <a:rPr lang="en-US" dirty="0" smtClean="0"/>
-              <a:t>,1) </a:t>
-            </a:r>
-            <a:r>
-              <a:rPr lang="en-US" dirty="0" smtClean="0"/>
-              <a:t>+ </a:t>
+              <a:t>,1) + </a:t>
             </a:r>
             <a:r>
               <a:rPr lang="el-GR" dirty="0" smtClean="0"/>
@@ -10390,7 +10378,6 @@
               <a:rPr lang="en-US" dirty="0" smtClean="0"/>
               <a:t>,2)</a:t>
             </a:r>
-            <a:endParaRPr lang="en-US" dirty="0" smtClean="0"/>
           </a:p>
         </p:txBody>
       </p:sp>
@@ -10422,11 +10409,7 @@
             </a:pPr>
             <a:r>
               <a:rPr lang="en-US" dirty="0" smtClean="0"/>
-              <a:t>pc</a:t>
-            </a:r>
-            <a:r>
-              <a:rPr lang="en-US" dirty="0" smtClean="0"/>
-              <a:t>(</a:t>
+              <a:t>pc(</a:t>
             </a:r>
             <a:r>
               <a:rPr lang="en-US" dirty="0" smtClean="0">
@@ -10466,11 +10449,7 @@
             </a:r>
             <a:r>
               <a:rPr lang="en-US" dirty="0" smtClean="0"/>
-              <a:t>,1) </a:t>
-            </a:r>
-            <a:r>
-              <a:rPr lang="en-US" dirty="0" smtClean="0"/>
-              <a:t>+ </a:t>
+              <a:t>,1) + </a:t>
             </a:r>
             <a:r>
               <a:rPr lang="el-GR" dirty="0" smtClean="0"/>
@@ -10508,7 +10487,6 @@
               <a:rPr lang="en-US" dirty="0" smtClean="0"/>
               <a:t>,2)</a:t>
             </a:r>
-            <a:endParaRPr lang="en-US" dirty="0" smtClean="0"/>
           </a:p>
         </p:txBody>
       </p:sp>
@@ -10969,23 +10947,7 @@
           <a:p>
             <a:r>
               <a:rPr lang="en-US" sz="2000" dirty="0" smtClean="0"/>
-              <a:t>105 samples </a:t>
-            </a:r>
-            <a:r>
-              <a:rPr lang="en-US" sz="2000" dirty="0" smtClean="0"/>
-              <a:t>with 2 genes are </a:t>
-            </a:r>
-            <a:r>
-              <a:rPr lang="en-US" sz="2000" dirty="0" smtClean="0"/>
-              <a:t>plotted in 2D </a:t>
-            </a:r>
-            <a:r>
-              <a:rPr lang="en-US" sz="2000" dirty="0" smtClean="0"/>
-              <a:t>as projections </a:t>
-            </a:r>
-            <a:r>
-              <a:rPr lang="en-US" sz="2000" dirty="0" smtClean="0"/>
-              <a:t>onto PC1 and PC2</a:t>
+              <a:t>105 samples with 2 genes are plotted in 2D as projections onto PC1 and PC2</a:t>
             </a:r>
             <a:endParaRPr lang="en-US" sz="2000" b="1" dirty="0">
               <a:solidFill>
@@ -11166,23 +11128,7 @@
           <a:p>
             <a:r>
               <a:rPr lang="en-US" sz="2000" dirty="0" smtClean="0"/>
-              <a:t>105 samples </a:t>
-            </a:r>
-            <a:r>
-              <a:rPr lang="en-US" sz="2000" dirty="0" smtClean="0"/>
-              <a:t>with 8,500 genes are </a:t>
-            </a:r>
-            <a:r>
-              <a:rPr lang="en-US" sz="2000" dirty="0" smtClean="0"/>
-              <a:t>plotted in 2D </a:t>
-            </a:r>
-            <a:r>
-              <a:rPr lang="en-US" sz="2000" dirty="0" smtClean="0"/>
-              <a:t>as projections </a:t>
-            </a:r>
-            <a:r>
-              <a:rPr lang="en-US" sz="2000" dirty="0" smtClean="0"/>
-              <a:t>onto PC1 and PC2</a:t>
+              <a:t>105 samples with 8,500 genes are plotted in 2D as projections onto PC1 and PC2</a:t>
             </a:r>
             <a:endParaRPr lang="en-US" sz="2000" b="1" dirty="0">
               <a:solidFill>
@@ -12750,11 +12696,7 @@
             </a:pPr>
             <a:r>
               <a:rPr lang="en-US" dirty="0" smtClean="0"/>
-              <a:t>1 </a:t>
-            </a:r>
-            <a:r>
-              <a:rPr lang="en-US" dirty="0" smtClean="0"/>
-              <a:t>variable? </a:t>
+              <a:t>1 variable? </a:t>
             </a:r>
           </a:p>
           <a:p>
@@ -12782,7 +12724,6 @@
               <a:rPr lang="en-US" dirty="0" smtClean="0"/>
               <a:t>3 variables?</a:t>
             </a:r>
-            <a:endParaRPr lang="en-US" dirty="0" smtClean="0"/>
           </a:p>
           <a:p>
             <a:pPr marL="285750" indent="-285750">
@@ -12794,13 +12735,8 @@
             </a:pPr>
             <a:r>
               <a:rPr lang="en-US" dirty="0" smtClean="0"/>
-              <a:t>4 </a:t>
-            </a:r>
-            <a:r>
-              <a:rPr lang="en-US" dirty="0" smtClean="0"/>
-              <a:t>variables?</a:t>
-            </a:r>
-            <a:endParaRPr lang="en-US" dirty="0" smtClean="0"/>
+              <a:t>4 variables?</a:t>
+            </a:r>
           </a:p>
           <a:p>
             <a:pPr marL="285750" indent="-285750">
@@ -12812,13 +12748,8 @@
             </a:pPr>
             <a:r>
               <a:rPr lang="en-US" dirty="0" smtClean="0"/>
-              <a:t>Systems biology problem →  ~1000s of </a:t>
-            </a:r>
-            <a:r>
-              <a:rPr lang="en-US" dirty="0" smtClean="0"/>
-              <a:t>variables?</a:t>
-            </a:r>
-            <a:endParaRPr lang="en-US" dirty="0" smtClean="0"/>
+              <a:t>Systems biology problem →  ~1000s of variables?</a:t>
+            </a:r>
           </a:p>
         </p:txBody>
       </p:sp>
@@ -14572,6 +14503,103 @@
     <p:extLst>
       <p:ext uri="{BB962C8B-B14F-4D97-AF65-F5344CB8AC3E}">
         <p14:creationId xmlns:p14="http://schemas.microsoft.com/office/powerpoint/2010/main" val="285910913"/>
+      </p:ext>
+    </p:extLst>
+  </p:cSld>
+  <p:clrMapOvr>
+    <a:masterClrMapping/>
+  </p:clrMapOvr>
+</p:sld>
+</file>
+
+<file path=ppt/slides/slide36.xml><?xml version="1.0" encoding="utf-8"?>
+<p:sld xmlns:a="http://schemas.openxmlformats.org/drawingml/2006/main" xmlns:r="http://schemas.openxmlformats.org/officeDocument/2006/relationships" xmlns:p="http://schemas.openxmlformats.org/presentationml/2006/main">
+  <p:cSld>
+    <p:spTree>
+      <p:nvGrpSpPr>
+        <p:cNvPr id="1" name=""/>
+        <p:cNvGrpSpPr/>
+        <p:nvPr/>
+      </p:nvGrpSpPr>
+      <p:grpSpPr>
+        <a:xfrm>
+          <a:off x="0" y="0"/>
+          <a:ext cx="0" cy="0"/>
+          <a:chOff x="0" y="0"/>
+          <a:chExt cx="0" cy="0"/>
+        </a:xfrm>
+      </p:grpSpPr>
+      <p:sp>
+        <p:nvSpPr>
+          <p:cNvPr id="2" name="TextBox 1"/>
+          <p:cNvSpPr txBox="1"/>
+          <p:nvPr/>
+        </p:nvSpPr>
+        <p:spPr>
+          <a:xfrm>
+            <a:off x="2241202" y="1981200"/>
+            <a:ext cx="4661597" cy="2000548"/>
+          </a:xfrm>
+          <a:prstGeom prst="rect">
+            <a:avLst/>
+          </a:prstGeom>
+          <a:noFill/>
+        </p:spPr>
+        <p:txBody>
+          <a:bodyPr wrap="none" rtlCol="0">
+            <a:spAutoFit/>
+          </a:bodyPr>
+          <a:lstStyle/>
+          <a:p>
+            <a:pPr algn="ctr"/>
+            <a:r>
+              <a:rPr lang="en-US" sz="2800" dirty="0" smtClean="0"/>
+              <a:t>Diana Murray</a:t>
+            </a:r>
+          </a:p>
+          <a:p>
+            <a:pPr algn="ctr"/>
+            <a:r>
+              <a:rPr lang="en-US" sz="2000" u="sng" dirty="0" smtClean="0">
+                <a:hlinkClick r:id="rId2"/>
+              </a:rPr>
+              <a:t>dm527@cumc.columbia.edu</a:t>
+            </a:r>
+            <a:endParaRPr lang="en-US" sz="2000" u="sng" dirty="0" smtClean="0"/>
+          </a:p>
+          <a:p>
+            <a:pPr algn="ctr"/>
+            <a:endParaRPr lang="en-US" sz="2400" dirty="0" smtClean="0"/>
+          </a:p>
+          <a:p>
+            <a:pPr algn="ctr"/>
+            <a:r>
+              <a:rPr lang="en-US" sz="2400" dirty="0"/>
+              <a:t>Department of Systems </a:t>
+            </a:r>
+            <a:r>
+              <a:rPr lang="en-US" sz="2400" dirty="0" smtClean="0"/>
+              <a:t>Biology</a:t>
+            </a:r>
+          </a:p>
+          <a:p>
+            <a:pPr algn="ctr"/>
+            <a:r>
+              <a:rPr lang="en-US" sz="2400" dirty="0" smtClean="0"/>
+              <a:t>Columbia </a:t>
+            </a:r>
+            <a:r>
+              <a:rPr lang="en-US" sz="2400" dirty="0"/>
+              <a:t>University Medical Center</a:t>
+            </a:r>
+            <a:endParaRPr lang="en-US" sz="2400" dirty="0"/>
+          </a:p>
+        </p:txBody>
+      </p:sp>
+    </p:spTree>
+    <p:extLst>
+      <p:ext uri="{BB962C8B-B14F-4D97-AF65-F5344CB8AC3E}">
+        <p14:creationId xmlns:p14="http://schemas.microsoft.com/office/powerpoint/2010/main" val="1849329741"/>
       </p:ext>
     </p:extLst>
   </p:cSld>
@@ -17305,14 +17333,6 @@
               </a:rPr>
               <a:t>Which model will do a better job of predicting independent data?</a:t>
             </a:r>
-            <a:endParaRPr lang="en-US" sz="2000" b="1" dirty="0" smtClean="0">
-              <a:solidFill>
-                <a:schemeClr val="tx1">
-                  <a:lumMod val="50000"/>
-                  <a:lumOff val="50000"/>
-                </a:schemeClr>
-              </a:solidFill>
-            </a:endParaRPr>
           </a:p>
         </p:txBody>
       </p:sp>

</xml_diff>